<commit_message>
ran the problem formulations model to check outcomes
</commit_message>
<xml_diff>
--- a/final assignment/EPAcourse_presentation.pptx
+++ b/final assignment/EPAcourse_presentation.pptx
@@ -225,7 +225,7 @@
           <a:p>
             <a:fld id="{DBAE3B3E-782A-9745-8E84-372F7B6771BF}" type="datetimeFigureOut">
               <a:rPr lang="en-US" smtClean="0"/>
-              <a:t>5/28/20</a:t>
+              <a:t>5/28/23</a:t>
             </a:fld>
             <a:endParaRPr lang="en-US" dirty="0"/>
           </a:p>
@@ -965,7 +965,7 @@
           <a:p>
             <a:fld id="{462A2416-1570-3849-86F9-07F78746E1B2}" type="datetimeFigureOut">
               <a:rPr lang="en-US" smtClean="0"/>
-              <a:t>5/28/20</a:t>
+              <a:t>5/28/23</a:t>
             </a:fld>
             <a:endParaRPr lang="en-US" dirty="0"/>
           </a:p>
@@ -1488,7 +1488,7 @@
           <a:p>
             <a:fld id="{B92CE7AE-4D4B-4F34-9461-F901B2CB1E63}" type="datetime1">
               <a:rPr lang="de-DE" smtClean="0"/>
-              <a:t>28.05.20</a:t>
+              <a:t>28.05.23</a:t>
             </a:fld>
             <a:endParaRPr lang="de-DE"/>
           </a:p>
@@ -11479,7 +11479,7 @@
           <p:nvPr/>
         </p:nvPicPr>
         <p:blipFill>
-          <a:blip r:embed="rId3">
+          <a:blip r:embed="rId2">
             <a:extLst>
               <a:ext uri="{28A0092B-C50C-407E-A947-70E740481C1C}">
                 <a14:useLocalDpi xmlns:a14="http://schemas.microsoft.com/office/drawing/2010/main" val="0"/>
@@ -11533,7 +11533,7 @@
           <p:nvPr/>
         </p:nvPicPr>
         <p:blipFill>
-          <a:blip r:embed="rId4">
+          <a:blip r:embed="rId3">
             <a:extLst>
               <a:ext uri="{28A0092B-C50C-407E-A947-70E740481C1C}">
                 <a14:useLocalDpi xmlns:a14="http://schemas.microsoft.com/office/drawing/2010/main" val="0"/>
@@ -11587,7 +11587,7 @@
           <p:nvPr/>
         </p:nvPicPr>
         <p:blipFill>
-          <a:blip r:embed="rId5" cstate="print">
+          <a:blip r:embed="rId4" cstate="print">
             <a:extLst>
               <a:ext uri="{28A0092B-C50C-407E-A947-70E740481C1C}">
                 <a14:useLocalDpi xmlns:a14="http://schemas.microsoft.com/office/drawing/2010/main" val="0"/>
@@ -11668,7 +11668,7 @@
           <p:nvPr/>
         </p:nvPicPr>
         <p:blipFill>
-          <a:blip r:embed="rId6">
+          <a:blip r:embed="rId5">
             <a:extLst>
               <a:ext uri="{28A0092B-C50C-407E-A947-70E740481C1C}">
                 <a14:useLocalDpi xmlns:a14="http://schemas.microsoft.com/office/drawing/2010/main" val="0"/>
@@ -11819,7 +11819,7 @@
           <p:nvPr/>
         </p:nvPicPr>
         <p:blipFill>
-          <a:blip r:embed="rId5" cstate="print">
+          <a:blip r:embed="rId4" cstate="print">
             <a:extLst>
               <a:ext uri="{28A0092B-C50C-407E-A947-70E740481C1C}">
                 <a14:useLocalDpi xmlns:a14="http://schemas.microsoft.com/office/drawing/2010/main" val="0"/>
@@ -11886,7 +11886,7 @@
           <p:nvPr/>
         </p:nvPicPr>
         <p:blipFill>
-          <a:blip r:embed="rId7">
+          <a:blip r:embed="rId6">
             <a:extLst>
               <a:ext uri="{28A0092B-C50C-407E-A947-70E740481C1C}">
                 <a14:useLocalDpi xmlns:a14="http://schemas.microsoft.com/office/drawing/2010/main" val="0"/>
@@ -11953,12 +11953,12 @@
           <a:graphicData uri="http://schemas.openxmlformats.org/presentationml/2006/ole">
             <mc:AlternateContent xmlns:mc="http://schemas.openxmlformats.org/markup-compatibility/2006">
               <mc:Choice xmlns:v="urn:schemas-microsoft-com:vml" Requires="v">
-                <p:oleObj spid="_x0000_s2058" name="Equation" r:id="rId8" imgW="977760" imgH="228600" progId="Equation.DSMT4">
+                <p:oleObj name="Equation" r:id="rId7" imgW="977760" imgH="228600" progId="Equation.DSMT4">
                   <p:embed/>
                 </p:oleObj>
               </mc:Choice>
               <mc:Fallback>
-                <p:oleObj name="Equation" r:id="rId8" imgW="977760" imgH="228600" progId="Equation.DSMT4">
+                <p:oleObj name="Equation" r:id="rId7" imgW="977760" imgH="228600" progId="Equation.DSMT4">
                   <p:embed/>
                   <p:pic>
                     <p:nvPicPr>
@@ -11967,7 +11967,7 @@
                       <p:nvPr/>
                     </p:nvPicPr>
                     <p:blipFill>
-                      <a:blip r:embed="rId9"/>
+                      <a:blip r:embed="rId8"/>
                       <a:stretch>
                         <a:fillRect/>
                       </a:stretch>
@@ -11997,7 +11997,7 @@
           <p:nvPr/>
         </p:nvPicPr>
         <p:blipFill>
-          <a:blip r:embed="rId10">
+          <a:blip r:embed="rId9">
             <a:extLst>
               <a:ext uri="{28A0092B-C50C-407E-A947-70E740481C1C}">
                 <a14:useLocalDpi xmlns:a14="http://schemas.microsoft.com/office/drawing/2010/main" val="0"/>
@@ -12051,7 +12051,7 @@
           <p:nvPr/>
         </p:nvPicPr>
         <p:blipFill>
-          <a:blip r:embed="rId11" cstate="print">
+          <a:blip r:embed="rId10" cstate="print">
             <a:extLst>
               <a:ext uri="{28A0092B-C50C-407E-A947-70E740481C1C}">
                 <a14:useLocalDpi xmlns:a14="http://schemas.microsoft.com/office/drawing/2010/main" val="0"/>
@@ -12092,7 +12092,7 @@
           <p:nvPr/>
         </p:nvPicPr>
         <p:blipFill>
-          <a:blip r:embed="rId12" cstate="print">
+          <a:blip r:embed="rId11" cstate="print">
             <a:extLst>
               <a:ext uri="{28A0092B-C50C-407E-A947-70E740481C1C}">
                 <a14:useLocalDpi xmlns:a14="http://schemas.microsoft.com/office/drawing/2010/main" val="0"/>
@@ -12175,7 +12175,7 @@
                 <p:nvPr/>
               </p:nvPicPr>
               <p:blipFill>
-                <a:blip r:embed="rId13" cstate="screen">
+                <a:blip r:embed="rId12" cstate="screen">
                   <a:extLst>
                     <a:ext uri="{28A0092B-C50C-407E-A947-70E740481C1C}">
                       <a14:useLocalDpi xmlns:a14="http://schemas.microsoft.com/office/drawing/2010/main" val="0"/>
@@ -12243,7 +12243,7 @@
                   <p:nvPr/>
                 </p:nvPicPr>
                 <p:blipFill>
-                  <a:blip r:embed="rId14">
+                  <a:blip r:embed="rId13">
                     <a:extLst>
                       <a:ext uri="{28A0092B-C50C-407E-A947-70E740481C1C}">
                         <a14:useLocalDpi xmlns:a14="http://schemas.microsoft.com/office/drawing/2010/main" val="0"/>
@@ -12297,7 +12297,7 @@
                   <p:nvPr/>
                 </p:nvPicPr>
                 <p:blipFill>
-                  <a:blip r:embed="rId15" cstate="print">
+                  <a:blip r:embed="rId14" cstate="print">
                     <a:extLst>
                       <a:ext uri="{28A0092B-C50C-407E-A947-70E740481C1C}">
                         <a14:useLocalDpi xmlns:a14="http://schemas.microsoft.com/office/drawing/2010/main" val="0"/>
@@ -12539,7 +12539,7 @@
             <p:nvPr/>
           </p:nvPicPr>
           <p:blipFill>
-            <a:blip r:embed="rId16">
+            <a:blip r:embed="rId15">
               <a:extLst>
                 <a:ext uri="{28A0092B-C50C-407E-A947-70E740481C1C}">
                   <a14:useLocalDpi xmlns:a14="http://schemas.microsoft.com/office/drawing/2010/main" val="0"/>
@@ -12704,7 +12704,7 @@
             <p:nvPr/>
           </p:nvPicPr>
           <p:blipFill>
-            <a:blip r:embed="rId5" cstate="print">
+            <a:blip r:embed="rId4" cstate="print">
               <a:extLst>
                 <a:ext uri="{28A0092B-C50C-407E-A947-70E740481C1C}">
                   <a14:useLocalDpi xmlns:a14="http://schemas.microsoft.com/office/drawing/2010/main" val="0"/>
@@ -12745,7 +12745,7 @@
             <p:nvPr/>
           </p:nvPicPr>
           <p:blipFill>
-            <a:blip r:embed="rId5" cstate="print">
+            <a:blip r:embed="rId4" cstate="print">
               <a:extLst>
                 <a:ext uri="{28A0092B-C50C-407E-A947-70E740481C1C}">
                   <a14:useLocalDpi xmlns:a14="http://schemas.microsoft.com/office/drawing/2010/main" val="0"/>
@@ -12822,7 +12822,7 @@
           <p:nvPr/>
         </p:nvPicPr>
         <p:blipFill>
-          <a:blip r:embed="rId17">
+          <a:blip r:embed="rId16">
             <a:extLst>
               <a:ext uri="{28A0092B-C50C-407E-A947-70E740481C1C}">
                 <a14:useLocalDpi xmlns:a14="http://schemas.microsoft.com/office/drawing/2010/main" val="0"/>
@@ -12876,7 +12876,7 @@
           <p:nvPr/>
         </p:nvPicPr>
         <p:blipFill>
-          <a:blip r:embed="rId18">
+          <a:blip r:embed="rId17">
             <a:extLst>
               <a:ext uri="{28A0092B-C50C-407E-A947-70E740481C1C}">
                 <a14:useLocalDpi xmlns:a14="http://schemas.microsoft.com/office/drawing/2010/main" val="0"/>
@@ -13227,10 +13227,10 @@
         </p:nvGrpSpPr>
         <p:grpSpPr>
           <a:xfrm>
-            <a:off x="3248900" y="1801544"/>
-            <a:ext cx="2871762" cy="2871762"/>
-            <a:chOff x="3248900" y="1801544"/>
-            <a:chExt cx="2871762" cy="2871762"/>
+            <a:off x="3995936" y="1530079"/>
+            <a:ext cx="8349792" cy="2871762"/>
+            <a:chOff x="3995936" y="1530079"/>
+            <a:chExt cx="8349792" cy="2871762"/>
           </a:xfrm>
         </p:grpSpPr>
         <p:pic>
@@ -13242,7 +13242,7 @@
             <p:nvPr/>
           </p:nvPicPr>
           <p:blipFill>
-            <a:blip r:embed="rId19">
+            <a:blip r:embed="rId18">
               <a:extLst>
                 <a:ext uri="{28A0092B-C50C-407E-A947-70E740481C1C}">
                   <a14:useLocalDpi xmlns:a14="http://schemas.microsoft.com/office/drawing/2010/main" val="0"/>
@@ -13256,7 +13256,7 @@
           </p:blipFill>
           <p:spPr bwMode="auto">
             <a:xfrm>
-              <a:off x="3248900" y="1801544"/>
+              <a:off x="9473966" y="1530079"/>
               <a:ext cx="2871762" cy="2871762"/>
             </a:xfrm>
             <a:prstGeom prst="rect">
@@ -13328,7 +13328,7 @@
           <p:nvPr/>
         </p:nvPicPr>
         <p:blipFill>
-          <a:blip r:embed="rId12" cstate="print">
+          <a:blip r:embed="rId11" cstate="print">
             <a:extLst>
               <a:ext uri="{28A0092B-C50C-407E-A947-70E740481C1C}">
                 <a14:useLocalDpi xmlns:a14="http://schemas.microsoft.com/office/drawing/2010/main" val="0"/>

</xml_diff>